<commit_message>
images and tables added
</commit_message>
<xml_diff>
--- a/docs/ObhajobaZS.pptx
+++ b/docs/ObhajobaZS.pptx
@@ -5,19 +5,16 @@
     <p:sldMasterId id="2147483648" r:id="rId1"/>
   </p:sldMasterIdLst>
   <p:notesMasterIdLst>
-    <p:notesMasterId r:id="rId9"/>
+    <p:notesMasterId r:id="rId6"/>
   </p:notesMasterIdLst>
   <p:handoutMasterIdLst>
-    <p:handoutMasterId r:id="rId10"/>
+    <p:handoutMasterId r:id="rId7"/>
   </p:handoutMasterIdLst>
   <p:sldIdLst>
     <p:sldId id="285" r:id="rId2"/>
-    <p:sldId id="312" r:id="rId3"/>
-    <p:sldId id="311" r:id="rId4"/>
-    <p:sldId id="313" r:id="rId5"/>
-    <p:sldId id="314" r:id="rId6"/>
-    <p:sldId id="315" r:id="rId7"/>
-    <p:sldId id="293" r:id="rId8"/>
+    <p:sldId id="316" r:id="rId3"/>
+    <p:sldId id="317" r:id="rId4"/>
+    <p:sldId id="315" r:id="rId5"/>
   </p:sldIdLst>
   <p:sldSz cx="9144000" cy="6858000" type="screen4x3"/>
   <p:notesSz cx="6858000" cy="9144000"/>
@@ -875,7 +872,7 @@
           <a:p>
             <a:fld id="{EE1BD250-9BF5-4AE8-86BD-080F3A22271A}" type="slidenum">
               <a:rPr lang="cs-CZ" smtClean="0"/>
-              <a:t>3</a:t>
+              <a:t>2</a:t>
             </a:fld>
             <a:endParaRPr lang="cs-CZ"/>
           </a:p>
@@ -884,7 +881,7 @@
     </p:spTree>
     <p:extLst>
       <p:ext uri="{BB962C8B-B14F-4D97-AF65-F5344CB8AC3E}">
-        <p14:creationId xmlns:p14="http://schemas.microsoft.com/office/powerpoint/2010/main" val="2434500925"/>
+        <p14:creationId xmlns:p14="http://schemas.microsoft.com/office/powerpoint/2010/main" val="1976678444"/>
       </p:ext>
     </p:extLst>
   </p:cSld>
@@ -1010,7 +1007,7 @@
           <a:p>
             <a:fld id="{EE1BD250-9BF5-4AE8-86BD-080F3A22271A}" type="slidenum">
               <a:rPr lang="cs-CZ" smtClean="0"/>
-              <a:t>4</a:t>
+              <a:t>3</a:t>
             </a:fld>
             <a:endParaRPr lang="cs-CZ"/>
           </a:p>
@@ -1019,7 +1016,7 @@
     </p:spTree>
     <p:extLst>
       <p:ext uri="{BB962C8B-B14F-4D97-AF65-F5344CB8AC3E}">
-        <p14:creationId xmlns:p14="http://schemas.microsoft.com/office/powerpoint/2010/main" val="3620428639"/>
+        <p14:creationId xmlns:p14="http://schemas.microsoft.com/office/powerpoint/2010/main" val="1671617027"/>
       </p:ext>
     </p:extLst>
   </p:cSld>
@@ -1145,142 +1142,7 @@
           <a:p>
             <a:fld id="{EE1BD250-9BF5-4AE8-86BD-080F3A22271A}" type="slidenum">
               <a:rPr lang="cs-CZ" smtClean="0"/>
-              <a:t>5</a:t>
-            </a:fld>
-            <a:endParaRPr lang="cs-CZ"/>
-          </a:p>
-        </p:txBody>
-      </p:sp>
-    </p:spTree>
-    <p:extLst>
-      <p:ext uri="{BB962C8B-B14F-4D97-AF65-F5344CB8AC3E}">
-        <p14:creationId xmlns:p14="http://schemas.microsoft.com/office/powerpoint/2010/main" val="1727845636"/>
-      </p:ext>
-    </p:extLst>
-  </p:cSld>
-  <p:clrMapOvr>
-    <a:masterClrMapping/>
-  </p:clrMapOvr>
-</p:notes>
-</file>
-
-<file path=ppt/notesSlides/notesSlide5.xml><?xml version="1.0" encoding="utf-8"?>
-<p:notes xmlns:a="http://schemas.openxmlformats.org/drawingml/2006/main" xmlns:r="http://schemas.openxmlformats.org/officeDocument/2006/relationships" xmlns:p="http://schemas.openxmlformats.org/presentationml/2006/main">
-  <p:cSld>
-    <p:spTree>
-      <p:nvGrpSpPr>
-        <p:cNvPr id="1" name=""/>
-        <p:cNvGrpSpPr/>
-        <p:nvPr/>
-      </p:nvGrpSpPr>
-      <p:grpSpPr>
-        <a:xfrm>
-          <a:off x="0" y="0"/>
-          <a:ext cx="0" cy="0"/>
-          <a:chOff x="0" y="0"/>
-          <a:chExt cx="0" cy="0"/>
-        </a:xfrm>
-      </p:grpSpPr>
-      <p:sp>
-        <p:nvSpPr>
-          <p:cNvPr id="2" name="Zástupný symbol pro obrázek snímku 1"/>
-          <p:cNvSpPr>
-            <a:spLocks noGrp="1" noRot="1" noChangeAspect="1"/>
-          </p:cNvSpPr>
-          <p:nvPr>
-            <p:ph type="sldImg"/>
-          </p:nvPr>
-        </p:nvSpPr>
-        <p:spPr/>
-      </p:sp>
-      <p:sp>
-        <p:nvSpPr>
-          <p:cNvPr id="3" name="Zástupný symbol pro poznámky 2"/>
-          <p:cNvSpPr>
-            <a:spLocks noGrp="1"/>
-          </p:cNvSpPr>
-          <p:nvPr>
-            <p:ph type="body" idx="1"/>
-          </p:nvPr>
-        </p:nvSpPr>
-        <p:spPr/>
-        <p:txBody>
-          <a:bodyPr/>
-          <a:lstStyle/>
-          <a:p>
-            <a:r>
-              <a:rPr lang="cs-CZ" dirty="0"/>
-              <a:t>Druhou metodou </a:t>
-            </a:r>
-            <a:r>
-              <a:rPr lang="cs-CZ" dirty="0" err="1"/>
-              <a:t>trenovani</a:t>
-            </a:r>
-            <a:r>
-              <a:rPr lang="cs-CZ" dirty="0"/>
-              <a:t> neuronových sítí pro separaci řečníků je DC. Tato metoda spočívá ve vytvoření tzv. </a:t>
-            </a:r>
-            <a:r>
-              <a:rPr lang="cs-CZ" dirty="0" err="1"/>
-              <a:t>embedding</a:t>
-            </a:r>
-            <a:r>
-              <a:rPr lang="cs-CZ" dirty="0"/>
-              <a:t> vektorů pro jednotlivé </a:t>
-            </a:r>
-            <a:r>
-              <a:rPr lang="cs-CZ" dirty="0" err="1"/>
-              <a:t>time-frequency</a:t>
-            </a:r>
-            <a:r>
-              <a:rPr lang="cs-CZ" dirty="0"/>
-              <a:t> </a:t>
-            </a:r>
-            <a:r>
-              <a:rPr lang="cs-CZ" dirty="0" err="1"/>
-              <a:t>biny</a:t>
-            </a:r>
-            <a:r>
-              <a:rPr lang="cs-CZ" dirty="0"/>
-              <a:t>. Neuronová síť je v touto metodou učena tak, aby stejnému řečníku predikovala podobné vektory vlastností. Při separaci řečníků natrénovanou sítí jsou získány tyto vektory, které jsou následně </a:t>
-            </a:r>
-            <a:r>
-              <a:rPr lang="cs-CZ" dirty="0" err="1"/>
-              <a:t>klusterovány</a:t>
-            </a:r>
-            <a:r>
-              <a:rPr lang="cs-CZ" dirty="0"/>
-              <a:t> za pomoci algoritmu jako je KMEANS nebo GMM. Nakonec jsou těmito algoritmy odděleny </a:t>
-            </a:r>
-            <a:r>
-              <a:rPr lang="cs-CZ" dirty="0" err="1"/>
-              <a:t>biny</a:t>
-            </a:r>
-            <a:r>
-              <a:rPr lang="cs-CZ" dirty="0"/>
-              <a:t>, které patří prvnímu a druhému řečníku.</a:t>
-            </a:r>
-          </a:p>
-        </p:txBody>
-      </p:sp>
-      <p:sp>
-        <p:nvSpPr>
-          <p:cNvPr id="4" name="Zástupný symbol pro číslo snímku 3"/>
-          <p:cNvSpPr>
-            <a:spLocks noGrp="1"/>
-          </p:cNvSpPr>
-          <p:nvPr>
-            <p:ph type="sldNum" sz="quarter" idx="5"/>
-          </p:nvPr>
-        </p:nvSpPr>
-        <p:spPr/>
-        <p:txBody>
-          <a:bodyPr/>
-          <a:lstStyle/>
-          <a:p>
-            <a:fld id="{EE1BD250-9BF5-4AE8-86BD-080F3A22271A}" type="slidenum">
-              <a:rPr lang="cs-CZ" smtClean="0"/>
-              <a:t>6</a:t>
+              <a:t>4</a:t>
             </a:fld>
             <a:endParaRPr lang="cs-CZ"/>
           </a:p>
@@ -2731,7 +2593,23 @@
           <a:p>
             <a:r>
               <a:rPr lang="cs-CZ" dirty="0"/>
-              <a:t>Nikolas, Mino, Pavlus</a:t>
+              <a:t>Nikolas Patrik, Ján </a:t>
+            </a:r>
+            <a:r>
+              <a:rPr lang="cs-CZ" dirty="0" err="1"/>
+              <a:t>Pavlus</a:t>
+            </a:r>
+            <a:r>
+              <a:rPr lang="cs-CZ" dirty="0"/>
+              <a:t>, Milan </a:t>
+            </a:r>
+            <a:r>
+              <a:rPr lang="sk-SK" dirty="0"/>
+              <a:t>Š</a:t>
+            </a:r>
+            <a:r>
+              <a:rPr lang="cs-CZ" dirty="0"/>
+              <a:t>alko</a:t>
             </a:r>
           </a:p>
         </p:txBody>
@@ -2756,7 +2634,10 @@
           <a:bodyPr/>
           <a:lstStyle/>
           <a:p>
-            <a:endParaRPr lang="cs-CZ" sz="4000" b="1" dirty="0"/>
+            <a:r>
+              <a:rPr lang="cs-CZ" sz="4000" b="1" dirty="0"/>
+              <a:t>Automatický přepis textu (OCR)</a:t>
+            </a:r>
           </a:p>
         </p:txBody>
       </p:sp>
@@ -2795,7 +2676,7 @@
           <p:cNvPr id="2" name="Nadpis 1">
             <a:extLst>
               <a:ext uri="{FF2B5EF4-FFF2-40B4-BE49-F238E27FC236}">
-                <a16:creationId xmlns:a16="http://schemas.microsoft.com/office/drawing/2014/main" id="{BD5B246B-2C5F-4631-9CB4-6CF16D5D5B0F}"/>
+                <a16:creationId xmlns:a16="http://schemas.microsoft.com/office/drawing/2014/main" id="{B6BDDDA3-7169-4A63-A607-9D07D622E605}"/>
               </a:ext>
             </a:extLst>
           </p:cNvPr>
@@ -2813,117 +2694,498 @@
           <a:p>
             <a:r>
               <a:rPr lang="cs-CZ" dirty="0"/>
-              <a:t>Co používáme</a:t>
+              <a:t>Výsledky 2.</a:t>
             </a:r>
           </a:p>
         </p:txBody>
       </p:sp>
-      <p:sp>
-        <p:nvSpPr>
-          <p:cNvPr id="3" name="Zástupný obsah 2">
+      <p:graphicFrame>
+        <p:nvGraphicFramePr>
+          <p:cNvPr id="5" name="Tabuľka 5">
             <a:extLst>
               <a:ext uri="{FF2B5EF4-FFF2-40B4-BE49-F238E27FC236}">
-                <a16:creationId xmlns:a16="http://schemas.microsoft.com/office/drawing/2014/main" id="{0B63ABD7-3B15-422E-91EF-618538D71AFB}"/>
+                <a16:creationId xmlns:a16="http://schemas.microsoft.com/office/drawing/2014/main" id="{AA687ACA-31F4-4F30-A163-FAF4A7456E70}"/>
               </a:ext>
             </a:extLst>
           </p:cNvPr>
-          <p:cNvSpPr>
-            <a:spLocks noGrp="1"/>
-          </p:cNvSpPr>
+          <p:cNvGraphicFramePr>
+            <a:graphicFrameLocks noGrp="1"/>
+          </p:cNvGraphicFramePr>
           <p:nvPr>
-            <p:ph idx="1"/>
+            <p:extLst>
+              <p:ext uri="{D42A27DB-BD31-4B8C-83A1-F6EECF244321}">
+                <p14:modId xmlns:p14="http://schemas.microsoft.com/office/powerpoint/2010/main" val="1862285082"/>
+              </p:ext>
+            </p:extLst>
           </p:nvPr>
+        </p:nvGraphicFramePr>
+        <p:xfrm>
+          <a:off x="990600" y="2276872"/>
+          <a:ext cx="7162800" cy="1584177"/>
+        </p:xfrm>
+        <a:graphic>
+          <a:graphicData uri="http://schemas.openxmlformats.org/drawingml/2006/table">
+            <a:tbl>
+              <a:tblPr firstRow="1" bandRow="1">
+                <a:tableStyleId>{5C22544A-7EE6-4342-B048-85BDC9FD1C3A}</a:tableStyleId>
+              </a:tblPr>
+              <a:tblGrid>
+                <a:gridCol w="895350">
+                  <a:extLst>
+                    <a:ext uri="{9D8B030D-6E8A-4147-A177-3AD203B41FA5}">
+                      <a16:colId xmlns:a16="http://schemas.microsoft.com/office/drawing/2014/main" val="2577601169"/>
+                    </a:ext>
+                  </a:extLst>
+                </a:gridCol>
+                <a:gridCol w="895350">
+                  <a:extLst>
+                    <a:ext uri="{9D8B030D-6E8A-4147-A177-3AD203B41FA5}">
+                      <a16:colId xmlns:a16="http://schemas.microsoft.com/office/drawing/2014/main" val="1325210302"/>
+                    </a:ext>
+                  </a:extLst>
+                </a:gridCol>
+                <a:gridCol w="895350">
+                  <a:extLst>
+                    <a:ext uri="{9D8B030D-6E8A-4147-A177-3AD203B41FA5}">
+                      <a16:colId xmlns:a16="http://schemas.microsoft.com/office/drawing/2014/main" val="795890985"/>
+                    </a:ext>
+                  </a:extLst>
+                </a:gridCol>
+                <a:gridCol w="895350">
+                  <a:extLst>
+                    <a:ext uri="{9D8B030D-6E8A-4147-A177-3AD203B41FA5}">
+                      <a16:colId xmlns:a16="http://schemas.microsoft.com/office/drawing/2014/main" val="2683834073"/>
+                    </a:ext>
+                  </a:extLst>
+                </a:gridCol>
+                <a:gridCol w="895350">
+                  <a:extLst>
+                    <a:ext uri="{9D8B030D-6E8A-4147-A177-3AD203B41FA5}">
+                      <a16:colId xmlns:a16="http://schemas.microsoft.com/office/drawing/2014/main" val="2115529709"/>
+                    </a:ext>
+                  </a:extLst>
+                </a:gridCol>
+                <a:gridCol w="895350">
+                  <a:extLst>
+                    <a:ext uri="{9D8B030D-6E8A-4147-A177-3AD203B41FA5}">
+                      <a16:colId xmlns:a16="http://schemas.microsoft.com/office/drawing/2014/main" val="71739151"/>
+                    </a:ext>
+                  </a:extLst>
+                </a:gridCol>
+                <a:gridCol w="895350">
+                  <a:extLst>
+                    <a:ext uri="{9D8B030D-6E8A-4147-A177-3AD203B41FA5}">
+                      <a16:colId xmlns:a16="http://schemas.microsoft.com/office/drawing/2014/main" val="4004132665"/>
+                    </a:ext>
+                  </a:extLst>
+                </a:gridCol>
+                <a:gridCol w="895350">
+                  <a:extLst>
+                    <a:ext uri="{9D8B030D-6E8A-4147-A177-3AD203B41FA5}">
+                      <a16:colId xmlns:a16="http://schemas.microsoft.com/office/drawing/2014/main" val="513613378"/>
+                    </a:ext>
+                  </a:extLst>
+                </a:gridCol>
+              </a:tblGrid>
+              <a:tr h="528059">
+                <a:tc gridSpan="2">
+                  <a:txBody>
+                    <a:bodyPr/>
+                    <a:lstStyle/>
+                    <a:p>
+                      <a:r>
+                        <a:rPr lang="sk-SK" dirty="0" err="1"/>
+                        <a:t>Easy</a:t>
+                      </a:r>
+                      <a:endParaRPr lang="sk-SK" dirty="0"/>
+                    </a:p>
+                  </a:txBody>
+                  <a:tcPr/>
+                </a:tc>
+                <a:tc hMerge="1">
+                  <a:txBody>
+                    <a:bodyPr/>
+                    <a:lstStyle/>
+                    <a:p>
+                      <a:endParaRPr lang="sk-SK" dirty="0"/>
+                    </a:p>
+                  </a:txBody>
+                  <a:tcPr/>
+                </a:tc>
+                <a:tc gridSpan="2">
+                  <a:txBody>
+                    <a:bodyPr/>
+                    <a:lstStyle/>
+                    <a:p>
+                      <a:r>
+                        <a:rPr lang="sk-SK" dirty="0" err="1"/>
+                        <a:t>Medium</a:t>
+                      </a:r>
+                      <a:endParaRPr lang="sk-SK" dirty="0"/>
+                    </a:p>
+                  </a:txBody>
+                  <a:tcPr/>
+                </a:tc>
+                <a:tc hMerge="1">
+                  <a:txBody>
+                    <a:bodyPr/>
+                    <a:lstStyle/>
+                    <a:p>
+                      <a:endParaRPr lang="sk-SK" dirty="0"/>
+                    </a:p>
+                  </a:txBody>
+                  <a:tcPr/>
+                </a:tc>
+                <a:tc gridSpan="2">
+                  <a:txBody>
+                    <a:bodyPr/>
+                    <a:lstStyle/>
+                    <a:p>
+                      <a:r>
+                        <a:rPr lang="sk-SK" dirty="0" err="1"/>
+                        <a:t>Hard</a:t>
+                      </a:r>
+                      <a:endParaRPr lang="sk-SK" dirty="0"/>
+                    </a:p>
+                  </a:txBody>
+                  <a:tcPr/>
+                </a:tc>
+                <a:tc hMerge="1">
+                  <a:txBody>
+                    <a:bodyPr/>
+                    <a:lstStyle/>
+                    <a:p>
+                      <a:endParaRPr lang="sk-SK" dirty="0"/>
+                    </a:p>
+                  </a:txBody>
+                  <a:tcPr/>
+                </a:tc>
+                <a:tc gridSpan="2">
+                  <a:txBody>
+                    <a:bodyPr/>
+                    <a:lstStyle/>
+                    <a:p>
+                      <a:r>
+                        <a:rPr lang="sk-SK" dirty="0"/>
+                        <a:t>Spolu</a:t>
+                      </a:r>
+                    </a:p>
+                  </a:txBody>
+                  <a:tcPr/>
+                </a:tc>
+                <a:tc hMerge="1">
+                  <a:txBody>
+                    <a:bodyPr/>
+                    <a:lstStyle/>
+                    <a:p>
+                      <a:endParaRPr lang="sk-SK" dirty="0"/>
+                    </a:p>
+                  </a:txBody>
+                  <a:tcPr/>
+                </a:tc>
+                <a:extLst>
+                  <a:ext uri="{0D108BD9-81ED-4DB2-BD59-A6C34878D82A}">
+                    <a16:rowId xmlns:a16="http://schemas.microsoft.com/office/drawing/2014/main" val="2711245438"/>
+                  </a:ext>
+                </a:extLst>
+              </a:tr>
+              <a:tr h="528059">
+                <a:tc>
+                  <a:txBody>
+                    <a:bodyPr/>
+                    <a:lstStyle/>
+                    <a:p>
+                      <a:r>
+                        <a:rPr lang="sk-SK" dirty="0"/>
+                        <a:t>CER</a:t>
+                      </a:r>
+                    </a:p>
+                  </a:txBody>
+                  <a:tcPr/>
+                </a:tc>
+                <a:tc>
+                  <a:txBody>
+                    <a:bodyPr/>
+                    <a:lstStyle/>
+                    <a:p>
+                      <a:r>
+                        <a:rPr lang="sk-SK" dirty="0"/>
+                        <a:t>WER</a:t>
+                      </a:r>
+                    </a:p>
+                  </a:txBody>
+                  <a:tcPr/>
+                </a:tc>
+                <a:tc>
+                  <a:txBody>
+                    <a:bodyPr/>
+                    <a:lstStyle/>
+                    <a:p>
+                      <a:r>
+                        <a:rPr lang="sk-SK" dirty="0"/>
+                        <a:t>CER</a:t>
+                      </a:r>
+                    </a:p>
+                  </a:txBody>
+                  <a:tcPr/>
+                </a:tc>
+                <a:tc>
+                  <a:txBody>
+                    <a:bodyPr/>
+                    <a:lstStyle/>
+                    <a:p>
+                      <a:r>
+                        <a:rPr lang="sk-SK" dirty="0"/>
+                        <a:t>WER</a:t>
+                      </a:r>
+                    </a:p>
+                  </a:txBody>
+                  <a:tcPr/>
+                </a:tc>
+                <a:tc>
+                  <a:txBody>
+                    <a:bodyPr/>
+                    <a:lstStyle/>
+                    <a:p>
+                      <a:r>
+                        <a:rPr lang="sk-SK" dirty="0"/>
+                        <a:t>CER</a:t>
+                      </a:r>
+                    </a:p>
+                  </a:txBody>
+                  <a:tcPr/>
+                </a:tc>
+                <a:tc>
+                  <a:txBody>
+                    <a:bodyPr/>
+                    <a:lstStyle/>
+                    <a:p>
+                      <a:r>
+                        <a:rPr lang="sk-SK" dirty="0"/>
+                        <a:t>WER</a:t>
+                      </a:r>
+                    </a:p>
+                  </a:txBody>
+                  <a:tcPr/>
+                </a:tc>
+                <a:tc>
+                  <a:txBody>
+                    <a:bodyPr/>
+                    <a:lstStyle/>
+                    <a:p>
+                      <a:r>
+                        <a:rPr lang="sk-SK" dirty="0"/>
+                        <a:t>CER</a:t>
+                      </a:r>
+                    </a:p>
+                  </a:txBody>
+                  <a:tcPr/>
+                </a:tc>
+                <a:tc>
+                  <a:txBody>
+                    <a:bodyPr/>
+                    <a:lstStyle/>
+                    <a:p>
+                      <a:r>
+                        <a:rPr lang="sk-SK" dirty="0"/>
+                        <a:t>WER</a:t>
+                      </a:r>
+                    </a:p>
+                  </a:txBody>
+                  <a:tcPr/>
+                </a:tc>
+                <a:extLst>
+                  <a:ext uri="{0D108BD9-81ED-4DB2-BD59-A6C34878D82A}">
+                    <a16:rowId xmlns:a16="http://schemas.microsoft.com/office/drawing/2014/main" val="2399490816"/>
+                  </a:ext>
+                </a:extLst>
+              </a:tr>
+              <a:tr h="528059">
+                <a:tc>
+                  <a:txBody>
+                    <a:bodyPr/>
+                    <a:lstStyle/>
+                    <a:p>
+                      <a:r>
+                        <a:rPr lang="sk-SK" dirty="0"/>
+                        <a:t>0</a:t>
+                      </a:r>
+                      <a:r>
+                        <a:rPr lang="en-US" dirty="0"/>
+                        <a:t>.</a:t>
+                      </a:r>
+                      <a:r>
+                        <a:rPr lang="sk-SK" dirty="0"/>
+                        <a:t>52</a:t>
+                      </a:r>
+                    </a:p>
+                  </a:txBody>
+                  <a:tcPr/>
+                </a:tc>
+                <a:tc>
+                  <a:txBody>
+                    <a:bodyPr/>
+                    <a:lstStyle/>
+                    <a:p>
+                      <a:r>
+                        <a:rPr lang="en-US" dirty="0"/>
+                        <a:t>2.02</a:t>
+                      </a:r>
+                      <a:endParaRPr lang="sk-SK" dirty="0"/>
+                    </a:p>
+                  </a:txBody>
+                  <a:tcPr/>
+                </a:tc>
+                <a:tc>
+                  <a:txBody>
+                    <a:bodyPr/>
+                    <a:lstStyle/>
+                    <a:p>
+                      <a:r>
+                        <a:rPr lang="en-US" dirty="0"/>
+                        <a:t>4.15</a:t>
+                      </a:r>
+                      <a:endParaRPr lang="sk-SK" dirty="0"/>
+                    </a:p>
+                  </a:txBody>
+                  <a:tcPr/>
+                </a:tc>
+                <a:tc>
+                  <a:txBody>
+                    <a:bodyPr/>
+                    <a:lstStyle/>
+                    <a:p>
+                      <a:r>
+                        <a:rPr lang="en-US" dirty="0"/>
+                        <a:t>12.93</a:t>
+                      </a:r>
+                      <a:endParaRPr lang="sk-SK" dirty="0"/>
+                    </a:p>
+                  </a:txBody>
+                  <a:tcPr/>
+                </a:tc>
+                <a:tc>
+                  <a:txBody>
+                    <a:bodyPr/>
+                    <a:lstStyle/>
+                    <a:p>
+                      <a:r>
+                        <a:rPr lang="en-US" dirty="0"/>
+                        <a:t>28.38</a:t>
+                      </a:r>
+                      <a:endParaRPr lang="sk-SK" dirty="0"/>
+                    </a:p>
+                  </a:txBody>
+                  <a:tcPr/>
+                </a:tc>
+                <a:tc>
+                  <a:txBody>
+                    <a:bodyPr/>
+                    <a:lstStyle/>
+                    <a:p>
+                      <a:r>
+                        <a:rPr lang="en-US" dirty="0"/>
+                        <a:t>62.21</a:t>
+                      </a:r>
+                      <a:endParaRPr lang="sk-SK" dirty="0"/>
+                    </a:p>
+                  </a:txBody>
+                  <a:tcPr/>
+                </a:tc>
+                <a:tc>
+                  <a:txBody>
+                    <a:bodyPr/>
+                    <a:lstStyle/>
+                    <a:p>
+                      <a:r>
+                        <a:rPr lang="en-US" dirty="0"/>
+                        <a:t>2.68</a:t>
+                      </a:r>
+                      <a:endParaRPr lang="sk-SK" dirty="0"/>
+                    </a:p>
+                  </a:txBody>
+                  <a:tcPr/>
+                </a:tc>
+                <a:tc>
+                  <a:txBody>
+                    <a:bodyPr/>
+                    <a:lstStyle/>
+                    <a:p>
+                      <a:r>
+                        <a:rPr lang="en-US" dirty="0"/>
+                        <a:t>7.61</a:t>
+                      </a:r>
+                      <a:endParaRPr lang="sk-SK" dirty="0"/>
+                    </a:p>
+                  </a:txBody>
+                  <a:tcPr/>
+                </a:tc>
+                <a:extLst>
+                  <a:ext uri="{0D108BD9-81ED-4DB2-BD59-A6C34878D82A}">
+                    <a16:rowId xmlns:a16="http://schemas.microsoft.com/office/drawing/2014/main" val="1446949926"/>
+                  </a:ext>
+                </a:extLst>
+              </a:tr>
+            </a:tbl>
+          </a:graphicData>
+        </a:graphic>
+      </p:graphicFrame>
+      <p:sp>
+        <p:nvSpPr>
+          <p:cNvPr id="12" name="BlokTextu 11">
+            <a:extLst>
+              <a:ext uri="{FF2B5EF4-FFF2-40B4-BE49-F238E27FC236}">
+                <a16:creationId xmlns:a16="http://schemas.microsoft.com/office/drawing/2014/main" id="{1696A871-4955-47A6-8328-2BF892974825}"/>
+              </a:ext>
+            </a:extLst>
+          </p:cNvPr>
+          <p:cNvSpPr txBox="1"/>
+          <p:nvPr/>
         </p:nvSpPr>
-        <p:spPr/>
+        <p:spPr>
+          <a:xfrm>
+            <a:off x="990600" y="1524089"/>
+            <a:ext cx="7162800" cy="369332"/>
+          </a:xfrm>
+          <a:prstGeom prst="rect">
+            <a:avLst/>
+          </a:prstGeom>
+          <a:noFill/>
+        </p:spPr>
         <p:txBody>
-          <a:bodyPr/>
+          <a:bodyPr wrap="square">
+            <a:spAutoFit/>
+          </a:bodyPr>
           <a:lstStyle/>
           <a:p>
-            <a:pPr marL="457200" indent="-457200" algn="l">
-              <a:buFont typeface="Arial" panose="020B0604020202020204" pitchFamily="34" charset="0"/>
-              <a:buChar char="•"/>
-            </a:pPr>
-            <a:r>
-              <a:rPr lang="cs-CZ" dirty="0"/>
-              <a:t>Pero </a:t>
-            </a:r>
-            <a:r>
-              <a:rPr lang="cs-CZ" dirty="0" err="1"/>
-              <a:t>dataset</a:t>
-            </a:r>
-            <a:endParaRPr lang="cs-CZ" dirty="0"/>
-          </a:p>
-          <a:p>
-            <a:pPr marL="1200150" lvl="1" indent="-457200">
-              <a:buFont typeface="Arial" panose="020B0604020202020204" pitchFamily="34" charset="0"/>
-              <a:buChar char="•"/>
-            </a:pPr>
-            <a:r>
-              <a:rPr lang="cs-CZ" dirty="0"/>
-              <a:t>Řádky textu</a:t>
-            </a:r>
-          </a:p>
-          <a:p>
-            <a:pPr marL="457200" indent="-457200" algn="l">
-              <a:buFont typeface="Arial" panose="020B0604020202020204" pitchFamily="34" charset="0"/>
-              <a:buChar char="•"/>
-            </a:pPr>
-            <a:r>
-              <a:rPr lang="cs-CZ" dirty="0"/>
-              <a:t>CRNN model</a:t>
-            </a:r>
-          </a:p>
-          <a:p>
-            <a:pPr marL="1200150" lvl="1" indent="-457200">
-              <a:buFont typeface="Arial" panose="020B0604020202020204" pitchFamily="34" charset="0"/>
-              <a:buChar char="•"/>
-            </a:pPr>
-            <a:r>
-              <a:rPr lang="cs-CZ" dirty="0"/>
-              <a:t>Konvoluční síť</a:t>
-            </a:r>
-          </a:p>
-          <a:p>
-            <a:pPr marL="1200150" lvl="1" indent="-457200">
-              <a:buFont typeface="Arial" panose="020B0604020202020204" pitchFamily="34" charset="0"/>
-              <a:buChar char="•"/>
-            </a:pPr>
-            <a:r>
-              <a:rPr lang="cs-CZ" dirty="0"/>
-              <a:t>Dvě vrstvy BLSTM</a:t>
-            </a:r>
-          </a:p>
-          <a:p>
-            <a:pPr marL="457200" indent="-457200" algn="l">
-              <a:buFont typeface="Arial" panose="020B0604020202020204" pitchFamily="34" charset="0"/>
-              <a:buChar char="•"/>
-            </a:pPr>
-            <a:r>
-              <a:rPr lang="cs-CZ" dirty="0"/>
-              <a:t>Abeceda vygenerována z Pero </a:t>
-            </a:r>
-            <a:r>
-              <a:rPr lang="cs-CZ" dirty="0" err="1"/>
-              <a:t>datasetu</a:t>
-            </a:r>
-            <a:endParaRPr lang="cs-CZ" dirty="0"/>
-          </a:p>
-          <a:p>
-            <a:pPr marL="457200" indent="-457200" algn="l">
-              <a:buFont typeface="Arial" panose="020B0604020202020204" pitchFamily="34" charset="0"/>
-              <a:buChar char="•"/>
-            </a:pPr>
-            <a:r>
-              <a:rPr lang="cs-CZ" dirty="0"/>
-              <a:t>Metriky CER a WER (menší hodnota lepší)</a:t>
-            </a:r>
+            <a:r>
+              <a:rPr lang="sk-SK" dirty="0" err="1"/>
+              <a:t>Výsledek</a:t>
+            </a:r>
+            <a:r>
+              <a:rPr lang="sk-SK" dirty="0"/>
+              <a:t> modelu trénovaného na jednoduchých a </a:t>
+            </a:r>
+            <a:r>
+              <a:rPr lang="sk-SK" dirty="0" err="1"/>
+              <a:t>středních</a:t>
+            </a:r>
+            <a:r>
+              <a:rPr lang="sk-SK" dirty="0"/>
+              <a:t> </a:t>
+            </a:r>
+            <a:r>
+              <a:rPr lang="sk-SK" dirty="0" err="1"/>
+              <a:t>datech</a:t>
+            </a:r>
+            <a:endParaRPr lang="sk-SK" dirty="0"/>
           </a:p>
         </p:txBody>
       </p:sp>
     </p:spTree>
     <p:extLst>
       <p:ext uri="{BB962C8B-B14F-4D97-AF65-F5344CB8AC3E}">
-        <p14:creationId xmlns:p14="http://schemas.microsoft.com/office/powerpoint/2010/main" val="629526795"/>
+        <p14:creationId xmlns:p14="http://schemas.microsoft.com/office/powerpoint/2010/main" val="3973799598"/>
       </p:ext>
     </p:extLst>
   </p:cSld>
@@ -2973,15 +3235,1007 @@
           <a:p>
             <a:r>
               <a:rPr lang="cs-CZ" dirty="0"/>
-              <a:t>Výsledky</a:t>
-            </a:r>
+              <a:t>Výsledky </a:t>
+            </a:r>
+            <a:r>
+              <a:rPr lang="en-US" dirty="0"/>
+              <a:t>3</a:t>
+            </a:r>
+            <a:r>
+              <a:rPr lang="cs-CZ" dirty="0"/>
+              <a:t>.</a:t>
+            </a:r>
+          </a:p>
+        </p:txBody>
+      </p:sp>
+      <p:graphicFrame>
+        <p:nvGraphicFramePr>
+          <p:cNvPr id="5" name="Tabuľka 5">
+            <a:extLst>
+              <a:ext uri="{FF2B5EF4-FFF2-40B4-BE49-F238E27FC236}">
+                <a16:creationId xmlns:a16="http://schemas.microsoft.com/office/drawing/2014/main" id="{AA687ACA-31F4-4F30-A163-FAF4A7456E70}"/>
+              </a:ext>
+            </a:extLst>
+          </p:cNvPr>
+          <p:cNvGraphicFramePr>
+            <a:graphicFrameLocks noGrp="1"/>
+          </p:cNvGraphicFramePr>
+          <p:nvPr>
+            <p:extLst>
+              <p:ext uri="{D42A27DB-BD31-4B8C-83A1-F6EECF244321}">
+                <p14:modId xmlns:p14="http://schemas.microsoft.com/office/powerpoint/2010/main" val="871893273"/>
+              </p:ext>
+            </p:extLst>
+          </p:nvPr>
+        </p:nvGraphicFramePr>
+        <p:xfrm>
+          <a:off x="990600" y="1901797"/>
+          <a:ext cx="7162800" cy="1584177"/>
+        </p:xfrm>
+        <a:graphic>
+          <a:graphicData uri="http://schemas.openxmlformats.org/drawingml/2006/table">
+            <a:tbl>
+              <a:tblPr firstRow="1" bandRow="1">
+                <a:tableStyleId>{5C22544A-7EE6-4342-B048-85BDC9FD1C3A}</a:tableStyleId>
+              </a:tblPr>
+              <a:tblGrid>
+                <a:gridCol w="895350">
+                  <a:extLst>
+                    <a:ext uri="{9D8B030D-6E8A-4147-A177-3AD203B41FA5}">
+                      <a16:colId xmlns:a16="http://schemas.microsoft.com/office/drawing/2014/main" val="2577601169"/>
+                    </a:ext>
+                  </a:extLst>
+                </a:gridCol>
+                <a:gridCol w="895350">
+                  <a:extLst>
+                    <a:ext uri="{9D8B030D-6E8A-4147-A177-3AD203B41FA5}">
+                      <a16:colId xmlns:a16="http://schemas.microsoft.com/office/drawing/2014/main" val="1325210302"/>
+                    </a:ext>
+                  </a:extLst>
+                </a:gridCol>
+                <a:gridCol w="895350">
+                  <a:extLst>
+                    <a:ext uri="{9D8B030D-6E8A-4147-A177-3AD203B41FA5}">
+                      <a16:colId xmlns:a16="http://schemas.microsoft.com/office/drawing/2014/main" val="795890985"/>
+                    </a:ext>
+                  </a:extLst>
+                </a:gridCol>
+                <a:gridCol w="895350">
+                  <a:extLst>
+                    <a:ext uri="{9D8B030D-6E8A-4147-A177-3AD203B41FA5}">
+                      <a16:colId xmlns:a16="http://schemas.microsoft.com/office/drawing/2014/main" val="2683834073"/>
+                    </a:ext>
+                  </a:extLst>
+                </a:gridCol>
+                <a:gridCol w="895350">
+                  <a:extLst>
+                    <a:ext uri="{9D8B030D-6E8A-4147-A177-3AD203B41FA5}">
+                      <a16:colId xmlns:a16="http://schemas.microsoft.com/office/drawing/2014/main" val="2115529709"/>
+                    </a:ext>
+                  </a:extLst>
+                </a:gridCol>
+                <a:gridCol w="895350">
+                  <a:extLst>
+                    <a:ext uri="{9D8B030D-6E8A-4147-A177-3AD203B41FA5}">
+                      <a16:colId xmlns:a16="http://schemas.microsoft.com/office/drawing/2014/main" val="71739151"/>
+                    </a:ext>
+                  </a:extLst>
+                </a:gridCol>
+                <a:gridCol w="895350">
+                  <a:extLst>
+                    <a:ext uri="{9D8B030D-6E8A-4147-A177-3AD203B41FA5}">
+                      <a16:colId xmlns:a16="http://schemas.microsoft.com/office/drawing/2014/main" val="4004132665"/>
+                    </a:ext>
+                  </a:extLst>
+                </a:gridCol>
+                <a:gridCol w="895350">
+                  <a:extLst>
+                    <a:ext uri="{9D8B030D-6E8A-4147-A177-3AD203B41FA5}">
+                      <a16:colId xmlns:a16="http://schemas.microsoft.com/office/drawing/2014/main" val="513613378"/>
+                    </a:ext>
+                  </a:extLst>
+                </a:gridCol>
+              </a:tblGrid>
+              <a:tr h="528059">
+                <a:tc gridSpan="2">
+                  <a:txBody>
+                    <a:bodyPr/>
+                    <a:lstStyle/>
+                    <a:p>
+                      <a:r>
+                        <a:rPr lang="sk-SK" dirty="0" err="1"/>
+                        <a:t>Easy</a:t>
+                      </a:r>
+                      <a:endParaRPr lang="sk-SK" dirty="0"/>
+                    </a:p>
+                  </a:txBody>
+                  <a:tcPr/>
+                </a:tc>
+                <a:tc hMerge="1">
+                  <a:txBody>
+                    <a:bodyPr/>
+                    <a:lstStyle/>
+                    <a:p>
+                      <a:endParaRPr lang="sk-SK" dirty="0"/>
+                    </a:p>
+                  </a:txBody>
+                  <a:tcPr/>
+                </a:tc>
+                <a:tc gridSpan="2">
+                  <a:txBody>
+                    <a:bodyPr/>
+                    <a:lstStyle/>
+                    <a:p>
+                      <a:r>
+                        <a:rPr lang="sk-SK" dirty="0" err="1"/>
+                        <a:t>Medium</a:t>
+                      </a:r>
+                      <a:endParaRPr lang="sk-SK" dirty="0"/>
+                    </a:p>
+                  </a:txBody>
+                  <a:tcPr/>
+                </a:tc>
+                <a:tc hMerge="1">
+                  <a:txBody>
+                    <a:bodyPr/>
+                    <a:lstStyle/>
+                    <a:p>
+                      <a:endParaRPr lang="sk-SK" dirty="0"/>
+                    </a:p>
+                  </a:txBody>
+                  <a:tcPr/>
+                </a:tc>
+                <a:tc gridSpan="2">
+                  <a:txBody>
+                    <a:bodyPr/>
+                    <a:lstStyle/>
+                    <a:p>
+                      <a:r>
+                        <a:rPr lang="sk-SK" dirty="0" err="1"/>
+                        <a:t>Hard</a:t>
+                      </a:r>
+                      <a:endParaRPr lang="sk-SK" dirty="0"/>
+                    </a:p>
+                  </a:txBody>
+                  <a:tcPr/>
+                </a:tc>
+                <a:tc hMerge="1">
+                  <a:txBody>
+                    <a:bodyPr/>
+                    <a:lstStyle/>
+                    <a:p>
+                      <a:endParaRPr lang="sk-SK" dirty="0"/>
+                    </a:p>
+                  </a:txBody>
+                  <a:tcPr/>
+                </a:tc>
+                <a:tc gridSpan="2">
+                  <a:txBody>
+                    <a:bodyPr/>
+                    <a:lstStyle/>
+                    <a:p>
+                      <a:r>
+                        <a:rPr lang="sk-SK" dirty="0"/>
+                        <a:t>Spolu</a:t>
+                      </a:r>
+                    </a:p>
+                  </a:txBody>
+                  <a:tcPr/>
+                </a:tc>
+                <a:tc hMerge="1">
+                  <a:txBody>
+                    <a:bodyPr/>
+                    <a:lstStyle/>
+                    <a:p>
+                      <a:endParaRPr lang="sk-SK" dirty="0"/>
+                    </a:p>
+                  </a:txBody>
+                  <a:tcPr/>
+                </a:tc>
+                <a:extLst>
+                  <a:ext uri="{0D108BD9-81ED-4DB2-BD59-A6C34878D82A}">
+                    <a16:rowId xmlns:a16="http://schemas.microsoft.com/office/drawing/2014/main" val="2711245438"/>
+                  </a:ext>
+                </a:extLst>
+              </a:tr>
+              <a:tr h="528059">
+                <a:tc>
+                  <a:txBody>
+                    <a:bodyPr/>
+                    <a:lstStyle/>
+                    <a:p>
+                      <a:r>
+                        <a:rPr lang="sk-SK" dirty="0"/>
+                        <a:t>CER</a:t>
+                      </a:r>
+                    </a:p>
+                  </a:txBody>
+                  <a:tcPr/>
+                </a:tc>
+                <a:tc>
+                  <a:txBody>
+                    <a:bodyPr/>
+                    <a:lstStyle/>
+                    <a:p>
+                      <a:r>
+                        <a:rPr lang="sk-SK" dirty="0"/>
+                        <a:t>WER</a:t>
+                      </a:r>
+                    </a:p>
+                  </a:txBody>
+                  <a:tcPr/>
+                </a:tc>
+                <a:tc>
+                  <a:txBody>
+                    <a:bodyPr/>
+                    <a:lstStyle/>
+                    <a:p>
+                      <a:r>
+                        <a:rPr lang="sk-SK" dirty="0"/>
+                        <a:t>CER</a:t>
+                      </a:r>
+                    </a:p>
+                  </a:txBody>
+                  <a:tcPr/>
+                </a:tc>
+                <a:tc>
+                  <a:txBody>
+                    <a:bodyPr/>
+                    <a:lstStyle/>
+                    <a:p>
+                      <a:r>
+                        <a:rPr lang="sk-SK" dirty="0"/>
+                        <a:t>WER</a:t>
+                      </a:r>
+                    </a:p>
+                  </a:txBody>
+                  <a:tcPr/>
+                </a:tc>
+                <a:tc>
+                  <a:txBody>
+                    <a:bodyPr/>
+                    <a:lstStyle/>
+                    <a:p>
+                      <a:r>
+                        <a:rPr lang="sk-SK" dirty="0"/>
+                        <a:t>CER</a:t>
+                      </a:r>
+                    </a:p>
+                  </a:txBody>
+                  <a:tcPr/>
+                </a:tc>
+                <a:tc>
+                  <a:txBody>
+                    <a:bodyPr/>
+                    <a:lstStyle/>
+                    <a:p>
+                      <a:r>
+                        <a:rPr lang="sk-SK" dirty="0"/>
+                        <a:t>WER</a:t>
+                      </a:r>
+                    </a:p>
+                  </a:txBody>
+                  <a:tcPr/>
+                </a:tc>
+                <a:tc>
+                  <a:txBody>
+                    <a:bodyPr/>
+                    <a:lstStyle/>
+                    <a:p>
+                      <a:r>
+                        <a:rPr lang="sk-SK" dirty="0"/>
+                        <a:t>CER</a:t>
+                      </a:r>
+                    </a:p>
+                  </a:txBody>
+                  <a:tcPr/>
+                </a:tc>
+                <a:tc>
+                  <a:txBody>
+                    <a:bodyPr/>
+                    <a:lstStyle/>
+                    <a:p>
+                      <a:r>
+                        <a:rPr lang="sk-SK" dirty="0"/>
+                        <a:t>WER</a:t>
+                      </a:r>
+                    </a:p>
+                  </a:txBody>
+                  <a:tcPr/>
+                </a:tc>
+                <a:extLst>
+                  <a:ext uri="{0D108BD9-81ED-4DB2-BD59-A6C34878D82A}">
+                    <a16:rowId xmlns:a16="http://schemas.microsoft.com/office/drawing/2014/main" val="2399490816"/>
+                  </a:ext>
+                </a:extLst>
+              </a:tr>
+              <a:tr h="528059">
+                <a:tc>
+                  <a:txBody>
+                    <a:bodyPr/>
+                    <a:lstStyle/>
+                    <a:p>
+                      <a:r>
+                        <a:rPr lang="sk-SK" dirty="0"/>
+                        <a:t>0</a:t>
+                      </a:r>
+                      <a:r>
+                        <a:rPr lang="en-US" dirty="0"/>
+                        <a:t>.42</a:t>
+                      </a:r>
+                      <a:endParaRPr lang="sk-SK" dirty="0"/>
+                    </a:p>
+                  </a:txBody>
+                  <a:tcPr/>
+                </a:tc>
+                <a:tc>
+                  <a:txBody>
+                    <a:bodyPr/>
+                    <a:lstStyle/>
+                    <a:p>
+                      <a:r>
+                        <a:rPr lang="en-US" dirty="0"/>
+                        <a:t>1.63</a:t>
+                      </a:r>
+                      <a:endParaRPr lang="sk-SK" dirty="0"/>
+                    </a:p>
+                  </a:txBody>
+                  <a:tcPr/>
+                </a:tc>
+                <a:tc>
+                  <a:txBody>
+                    <a:bodyPr/>
+                    <a:lstStyle/>
+                    <a:p>
+                      <a:r>
+                        <a:rPr lang="en-US" dirty="0"/>
+                        <a:t>3.71</a:t>
+                      </a:r>
+                      <a:endParaRPr lang="sk-SK" dirty="0"/>
+                    </a:p>
+                  </a:txBody>
+                  <a:tcPr/>
+                </a:tc>
+                <a:tc>
+                  <a:txBody>
+                    <a:bodyPr/>
+                    <a:lstStyle/>
+                    <a:p>
+                      <a:r>
+                        <a:rPr lang="en-US" dirty="0"/>
+                        <a:t>12.44</a:t>
+                      </a:r>
+                      <a:endParaRPr lang="sk-SK" dirty="0"/>
+                    </a:p>
+                  </a:txBody>
+                  <a:tcPr/>
+                </a:tc>
+                <a:tc>
+                  <a:txBody>
+                    <a:bodyPr/>
+                    <a:lstStyle/>
+                    <a:p>
+                      <a:r>
+                        <a:rPr lang="en-US" dirty="0"/>
+                        <a:t>22.96</a:t>
+                      </a:r>
+                      <a:endParaRPr lang="sk-SK" dirty="0"/>
+                    </a:p>
+                  </a:txBody>
+                  <a:tcPr/>
+                </a:tc>
+                <a:tc>
+                  <a:txBody>
+                    <a:bodyPr/>
+                    <a:lstStyle/>
+                    <a:p>
+                      <a:r>
+                        <a:rPr lang="en-US" dirty="0"/>
+                        <a:t>53.66</a:t>
+                      </a:r>
+                      <a:endParaRPr lang="sk-SK" dirty="0"/>
+                    </a:p>
+                  </a:txBody>
+                  <a:tcPr/>
+                </a:tc>
+                <a:tc>
+                  <a:txBody>
+                    <a:bodyPr/>
+                    <a:lstStyle/>
+                    <a:p>
+                      <a:r>
+                        <a:rPr lang="en-US" dirty="0"/>
+                        <a:t>2.27</a:t>
+                      </a:r>
+                      <a:endParaRPr lang="sk-SK" dirty="0"/>
+                    </a:p>
+                  </a:txBody>
+                  <a:tcPr/>
+                </a:tc>
+                <a:tc>
+                  <a:txBody>
+                    <a:bodyPr/>
+                    <a:lstStyle/>
+                    <a:p>
+                      <a:r>
+                        <a:rPr lang="en-US" dirty="0"/>
+                        <a:t>6.86</a:t>
+                      </a:r>
+                      <a:endParaRPr lang="sk-SK" dirty="0"/>
+                    </a:p>
+                  </a:txBody>
+                  <a:tcPr/>
+                </a:tc>
+                <a:extLst>
+                  <a:ext uri="{0D108BD9-81ED-4DB2-BD59-A6C34878D82A}">
+                    <a16:rowId xmlns:a16="http://schemas.microsoft.com/office/drawing/2014/main" val="1446949926"/>
+                  </a:ext>
+                </a:extLst>
+              </a:tr>
+            </a:tbl>
+          </a:graphicData>
+        </a:graphic>
+      </p:graphicFrame>
+      <p:sp>
+        <p:nvSpPr>
+          <p:cNvPr id="12" name="BlokTextu 11">
+            <a:extLst>
+              <a:ext uri="{FF2B5EF4-FFF2-40B4-BE49-F238E27FC236}">
+                <a16:creationId xmlns:a16="http://schemas.microsoft.com/office/drawing/2014/main" id="{1696A871-4955-47A6-8328-2BF892974825}"/>
+              </a:ext>
+            </a:extLst>
+          </p:cNvPr>
+          <p:cNvSpPr txBox="1"/>
+          <p:nvPr/>
+        </p:nvSpPr>
+        <p:spPr>
+          <a:xfrm>
+            <a:off x="990600" y="1524089"/>
+            <a:ext cx="7162800" cy="369332"/>
+          </a:xfrm>
+          <a:prstGeom prst="rect">
+            <a:avLst/>
+          </a:prstGeom>
+          <a:noFill/>
+        </p:spPr>
+        <p:txBody>
+          <a:bodyPr wrap="square">
+            <a:spAutoFit/>
+          </a:bodyPr>
+          <a:lstStyle/>
+          <a:p>
+            <a:r>
+              <a:rPr lang="sk-SK" dirty="0" err="1"/>
+              <a:t>Výsledek</a:t>
+            </a:r>
+            <a:r>
+              <a:rPr lang="sk-SK" dirty="0"/>
+              <a:t> modelu trénovaného na celé </a:t>
+            </a:r>
+            <a:r>
+              <a:rPr lang="sk-SK" dirty="0" err="1"/>
+              <a:t>datové</a:t>
+            </a:r>
+            <a:r>
+              <a:rPr lang="sk-SK" dirty="0"/>
+              <a:t> </a:t>
+            </a:r>
+            <a:r>
+              <a:rPr lang="sk-SK" dirty="0" err="1"/>
+              <a:t>sadě</a:t>
+            </a:r>
+            <a:r>
+              <a:rPr lang="sk-SK" dirty="0"/>
+              <a:t> bez </a:t>
+            </a:r>
+            <a:r>
+              <a:rPr lang="en-US" dirty="0"/>
+              <a:t>dropout</a:t>
+            </a:r>
+            <a:endParaRPr lang="sk-SK" dirty="0"/>
+          </a:p>
+        </p:txBody>
+      </p:sp>
+      <p:graphicFrame>
+        <p:nvGraphicFramePr>
+          <p:cNvPr id="6" name="Tabuľka 5">
+            <a:extLst>
+              <a:ext uri="{FF2B5EF4-FFF2-40B4-BE49-F238E27FC236}">
+                <a16:creationId xmlns:a16="http://schemas.microsoft.com/office/drawing/2014/main" id="{5F8C9D79-52BC-4F96-8F58-CBBACBC53F1E}"/>
+              </a:ext>
+            </a:extLst>
+          </p:cNvPr>
+          <p:cNvGraphicFramePr>
+            <a:graphicFrameLocks noGrp="1"/>
+          </p:cNvGraphicFramePr>
+          <p:nvPr>
+            <p:extLst>
+              <p:ext uri="{D42A27DB-BD31-4B8C-83A1-F6EECF244321}">
+                <p14:modId xmlns:p14="http://schemas.microsoft.com/office/powerpoint/2010/main" val="81235448"/>
+              </p:ext>
+            </p:extLst>
+          </p:nvPr>
+        </p:nvGraphicFramePr>
+        <p:xfrm>
+          <a:off x="990600" y="4293096"/>
+          <a:ext cx="7162800" cy="1584177"/>
+        </p:xfrm>
+        <a:graphic>
+          <a:graphicData uri="http://schemas.openxmlformats.org/drawingml/2006/table">
+            <a:tbl>
+              <a:tblPr firstRow="1" bandRow="1">
+                <a:tableStyleId>{5C22544A-7EE6-4342-B048-85BDC9FD1C3A}</a:tableStyleId>
+              </a:tblPr>
+              <a:tblGrid>
+                <a:gridCol w="895350">
+                  <a:extLst>
+                    <a:ext uri="{9D8B030D-6E8A-4147-A177-3AD203B41FA5}">
+                      <a16:colId xmlns:a16="http://schemas.microsoft.com/office/drawing/2014/main" val="2577601169"/>
+                    </a:ext>
+                  </a:extLst>
+                </a:gridCol>
+                <a:gridCol w="895350">
+                  <a:extLst>
+                    <a:ext uri="{9D8B030D-6E8A-4147-A177-3AD203B41FA5}">
+                      <a16:colId xmlns:a16="http://schemas.microsoft.com/office/drawing/2014/main" val="1325210302"/>
+                    </a:ext>
+                  </a:extLst>
+                </a:gridCol>
+                <a:gridCol w="895350">
+                  <a:extLst>
+                    <a:ext uri="{9D8B030D-6E8A-4147-A177-3AD203B41FA5}">
+                      <a16:colId xmlns:a16="http://schemas.microsoft.com/office/drawing/2014/main" val="795890985"/>
+                    </a:ext>
+                  </a:extLst>
+                </a:gridCol>
+                <a:gridCol w="895350">
+                  <a:extLst>
+                    <a:ext uri="{9D8B030D-6E8A-4147-A177-3AD203B41FA5}">
+                      <a16:colId xmlns:a16="http://schemas.microsoft.com/office/drawing/2014/main" val="2683834073"/>
+                    </a:ext>
+                  </a:extLst>
+                </a:gridCol>
+                <a:gridCol w="895350">
+                  <a:extLst>
+                    <a:ext uri="{9D8B030D-6E8A-4147-A177-3AD203B41FA5}">
+                      <a16:colId xmlns:a16="http://schemas.microsoft.com/office/drawing/2014/main" val="2115529709"/>
+                    </a:ext>
+                  </a:extLst>
+                </a:gridCol>
+                <a:gridCol w="895350">
+                  <a:extLst>
+                    <a:ext uri="{9D8B030D-6E8A-4147-A177-3AD203B41FA5}">
+                      <a16:colId xmlns:a16="http://schemas.microsoft.com/office/drawing/2014/main" val="71739151"/>
+                    </a:ext>
+                  </a:extLst>
+                </a:gridCol>
+                <a:gridCol w="895350">
+                  <a:extLst>
+                    <a:ext uri="{9D8B030D-6E8A-4147-A177-3AD203B41FA5}">
+                      <a16:colId xmlns:a16="http://schemas.microsoft.com/office/drawing/2014/main" val="4004132665"/>
+                    </a:ext>
+                  </a:extLst>
+                </a:gridCol>
+                <a:gridCol w="895350">
+                  <a:extLst>
+                    <a:ext uri="{9D8B030D-6E8A-4147-A177-3AD203B41FA5}">
+                      <a16:colId xmlns:a16="http://schemas.microsoft.com/office/drawing/2014/main" val="513613378"/>
+                    </a:ext>
+                  </a:extLst>
+                </a:gridCol>
+              </a:tblGrid>
+              <a:tr h="528059">
+                <a:tc gridSpan="2">
+                  <a:txBody>
+                    <a:bodyPr/>
+                    <a:lstStyle/>
+                    <a:p>
+                      <a:r>
+                        <a:rPr lang="sk-SK" dirty="0" err="1"/>
+                        <a:t>Easy</a:t>
+                      </a:r>
+                      <a:endParaRPr lang="sk-SK" dirty="0"/>
+                    </a:p>
+                  </a:txBody>
+                  <a:tcPr/>
+                </a:tc>
+                <a:tc hMerge="1">
+                  <a:txBody>
+                    <a:bodyPr/>
+                    <a:lstStyle/>
+                    <a:p>
+                      <a:endParaRPr lang="sk-SK" dirty="0"/>
+                    </a:p>
+                  </a:txBody>
+                  <a:tcPr/>
+                </a:tc>
+                <a:tc gridSpan="2">
+                  <a:txBody>
+                    <a:bodyPr/>
+                    <a:lstStyle/>
+                    <a:p>
+                      <a:r>
+                        <a:rPr lang="sk-SK" dirty="0" err="1"/>
+                        <a:t>Medium</a:t>
+                      </a:r>
+                      <a:endParaRPr lang="sk-SK" dirty="0"/>
+                    </a:p>
+                  </a:txBody>
+                  <a:tcPr/>
+                </a:tc>
+                <a:tc hMerge="1">
+                  <a:txBody>
+                    <a:bodyPr/>
+                    <a:lstStyle/>
+                    <a:p>
+                      <a:endParaRPr lang="sk-SK" dirty="0"/>
+                    </a:p>
+                  </a:txBody>
+                  <a:tcPr/>
+                </a:tc>
+                <a:tc gridSpan="2">
+                  <a:txBody>
+                    <a:bodyPr/>
+                    <a:lstStyle/>
+                    <a:p>
+                      <a:r>
+                        <a:rPr lang="sk-SK" dirty="0" err="1"/>
+                        <a:t>Hard</a:t>
+                      </a:r>
+                      <a:endParaRPr lang="sk-SK" dirty="0"/>
+                    </a:p>
+                  </a:txBody>
+                  <a:tcPr/>
+                </a:tc>
+                <a:tc hMerge="1">
+                  <a:txBody>
+                    <a:bodyPr/>
+                    <a:lstStyle/>
+                    <a:p>
+                      <a:endParaRPr lang="sk-SK" dirty="0"/>
+                    </a:p>
+                  </a:txBody>
+                  <a:tcPr/>
+                </a:tc>
+                <a:tc gridSpan="2">
+                  <a:txBody>
+                    <a:bodyPr/>
+                    <a:lstStyle/>
+                    <a:p>
+                      <a:r>
+                        <a:rPr lang="sk-SK" dirty="0"/>
+                        <a:t>Spolu</a:t>
+                      </a:r>
+                    </a:p>
+                  </a:txBody>
+                  <a:tcPr/>
+                </a:tc>
+                <a:tc hMerge="1">
+                  <a:txBody>
+                    <a:bodyPr/>
+                    <a:lstStyle/>
+                    <a:p>
+                      <a:endParaRPr lang="sk-SK" dirty="0"/>
+                    </a:p>
+                  </a:txBody>
+                  <a:tcPr/>
+                </a:tc>
+                <a:extLst>
+                  <a:ext uri="{0D108BD9-81ED-4DB2-BD59-A6C34878D82A}">
+                    <a16:rowId xmlns:a16="http://schemas.microsoft.com/office/drawing/2014/main" val="2711245438"/>
+                  </a:ext>
+                </a:extLst>
+              </a:tr>
+              <a:tr h="528059">
+                <a:tc>
+                  <a:txBody>
+                    <a:bodyPr/>
+                    <a:lstStyle/>
+                    <a:p>
+                      <a:r>
+                        <a:rPr lang="sk-SK" dirty="0"/>
+                        <a:t>CER</a:t>
+                      </a:r>
+                    </a:p>
+                  </a:txBody>
+                  <a:tcPr/>
+                </a:tc>
+                <a:tc>
+                  <a:txBody>
+                    <a:bodyPr/>
+                    <a:lstStyle/>
+                    <a:p>
+                      <a:r>
+                        <a:rPr lang="sk-SK" dirty="0"/>
+                        <a:t>WER</a:t>
+                      </a:r>
+                    </a:p>
+                  </a:txBody>
+                  <a:tcPr/>
+                </a:tc>
+                <a:tc>
+                  <a:txBody>
+                    <a:bodyPr/>
+                    <a:lstStyle/>
+                    <a:p>
+                      <a:r>
+                        <a:rPr lang="sk-SK" dirty="0"/>
+                        <a:t>CER</a:t>
+                      </a:r>
+                    </a:p>
+                  </a:txBody>
+                  <a:tcPr/>
+                </a:tc>
+                <a:tc>
+                  <a:txBody>
+                    <a:bodyPr/>
+                    <a:lstStyle/>
+                    <a:p>
+                      <a:r>
+                        <a:rPr lang="sk-SK" dirty="0"/>
+                        <a:t>WER</a:t>
+                      </a:r>
+                    </a:p>
+                  </a:txBody>
+                  <a:tcPr/>
+                </a:tc>
+                <a:tc>
+                  <a:txBody>
+                    <a:bodyPr/>
+                    <a:lstStyle/>
+                    <a:p>
+                      <a:r>
+                        <a:rPr lang="sk-SK" dirty="0"/>
+                        <a:t>CER</a:t>
+                      </a:r>
+                    </a:p>
+                  </a:txBody>
+                  <a:tcPr/>
+                </a:tc>
+                <a:tc>
+                  <a:txBody>
+                    <a:bodyPr/>
+                    <a:lstStyle/>
+                    <a:p>
+                      <a:r>
+                        <a:rPr lang="sk-SK" dirty="0"/>
+                        <a:t>WER</a:t>
+                      </a:r>
+                    </a:p>
+                  </a:txBody>
+                  <a:tcPr/>
+                </a:tc>
+                <a:tc>
+                  <a:txBody>
+                    <a:bodyPr/>
+                    <a:lstStyle/>
+                    <a:p>
+                      <a:r>
+                        <a:rPr lang="sk-SK" dirty="0"/>
+                        <a:t>CER</a:t>
+                      </a:r>
+                    </a:p>
+                  </a:txBody>
+                  <a:tcPr/>
+                </a:tc>
+                <a:tc>
+                  <a:txBody>
+                    <a:bodyPr/>
+                    <a:lstStyle/>
+                    <a:p>
+                      <a:r>
+                        <a:rPr lang="sk-SK" dirty="0"/>
+                        <a:t>WER</a:t>
+                      </a:r>
+                    </a:p>
+                  </a:txBody>
+                  <a:tcPr/>
+                </a:tc>
+                <a:extLst>
+                  <a:ext uri="{0D108BD9-81ED-4DB2-BD59-A6C34878D82A}">
+                    <a16:rowId xmlns:a16="http://schemas.microsoft.com/office/drawing/2014/main" val="2399490816"/>
+                  </a:ext>
+                </a:extLst>
+              </a:tr>
+              <a:tr h="528059">
+                <a:tc>
+                  <a:txBody>
+                    <a:bodyPr/>
+                    <a:lstStyle/>
+                    <a:p>
+                      <a:r>
+                        <a:rPr lang="sk-SK" dirty="0"/>
+                        <a:t>0</a:t>
+                      </a:r>
+                      <a:r>
+                        <a:rPr lang="en-US" dirty="0"/>
+                        <a:t>.55</a:t>
+                      </a:r>
+                      <a:endParaRPr lang="sk-SK" dirty="0"/>
+                    </a:p>
+                  </a:txBody>
+                  <a:tcPr/>
+                </a:tc>
+                <a:tc>
+                  <a:txBody>
+                    <a:bodyPr/>
+                    <a:lstStyle/>
+                    <a:p>
+                      <a:r>
+                        <a:rPr lang="en-US" dirty="0"/>
+                        <a:t>2.19</a:t>
+                      </a:r>
+                      <a:endParaRPr lang="sk-SK" dirty="0"/>
+                    </a:p>
+                  </a:txBody>
+                  <a:tcPr/>
+                </a:tc>
+                <a:tc>
+                  <a:txBody>
+                    <a:bodyPr/>
+                    <a:lstStyle/>
+                    <a:p>
+                      <a:r>
+                        <a:rPr lang="en-US" dirty="0"/>
+                        <a:t>5.00</a:t>
+                      </a:r>
+                      <a:endParaRPr lang="sk-SK" dirty="0"/>
+                    </a:p>
+                  </a:txBody>
+                  <a:tcPr/>
+                </a:tc>
+                <a:tc>
+                  <a:txBody>
+                    <a:bodyPr/>
+                    <a:lstStyle/>
+                    <a:p>
+                      <a:r>
+                        <a:rPr lang="en-US" dirty="0"/>
+                        <a:t>16.96</a:t>
+                      </a:r>
+                      <a:endParaRPr lang="sk-SK" dirty="0"/>
+                    </a:p>
+                  </a:txBody>
+                  <a:tcPr/>
+                </a:tc>
+                <a:tc>
+                  <a:txBody>
+                    <a:bodyPr/>
+                    <a:lstStyle/>
+                    <a:p>
+                      <a:r>
+                        <a:rPr lang="en-US" dirty="0"/>
+                        <a:t>38.72</a:t>
+                      </a:r>
+                      <a:endParaRPr lang="sk-SK" dirty="0"/>
+                    </a:p>
+                  </a:txBody>
+                  <a:tcPr/>
+                </a:tc>
+                <a:tc>
+                  <a:txBody>
+                    <a:bodyPr/>
+                    <a:lstStyle/>
+                    <a:p>
+                      <a:r>
+                        <a:rPr lang="en-US" dirty="0"/>
+                        <a:t>75.95</a:t>
+                      </a:r>
+                      <a:endParaRPr lang="sk-SK" dirty="0"/>
+                    </a:p>
+                  </a:txBody>
+                  <a:tcPr/>
+                </a:tc>
+                <a:tc>
+                  <a:txBody>
+                    <a:bodyPr/>
+                    <a:lstStyle/>
+                    <a:p>
+                      <a:r>
+                        <a:rPr lang="en-US" dirty="0"/>
+                        <a:t>3.36</a:t>
+                      </a:r>
+                      <a:endParaRPr lang="sk-SK" dirty="0"/>
+                    </a:p>
+                  </a:txBody>
+                  <a:tcPr/>
+                </a:tc>
+                <a:tc>
+                  <a:txBody>
+                    <a:bodyPr/>
+                    <a:lstStyle/>
+                    <a:p>
+                      <a:r>
+                        <a:rPr lang="en-US" dirty="0"/>
+                        <a:t>9.44</a:t>
+                      </a:r>
+                      <a:endParaRPr lang="sk-SK" dirty="0"/>
+                    </a:p>
+                  </a:txBody>
+                  <a:tcPr/>
+                </a:tc>
+                <a:extLst>
+                  <a:ext uri="{0D108BD9-81ED-4DB2-BD59-A6C34878D82A}">
+                    <a16:rowId xmlns:a16="http://schemas.microsoft.com/office/drawing/2014/main" val="1446949926"/>
+                  </a:ext>
+                </a:extLst>
+              </a:tr>
+            </a:tbl>
+          </a:graphicData>
+        </a:graphic>
+      </p:graphicFrame>
+      <p:sp>
+        <p:nvSpPr>
+          <p:cNvPr id="7" name="BlokTextu 6">
+            <a:extLst>
+              <a:ext uri="{FF2B5EF4-FFF2-40B4-BE49-F238E27FC236}">
+                <a16:creationId xmlns:a16="http://schemas.microsoft.com/office/drawing/2014/main" id="{D87BB53B-8EBD-4480-ABA6-4D1582972EF7}"/>
+              </a:ext>
+            </a:extLst>
+          </p:cNvPr>
+          <p:cNvSpPr txBox="1"/>
+          <p:nvPr/>
+        </p:nvSpPr>
+        <p:spPr>
+          <a:xfrm>
+            <a:off x="990600" y="3916516"/>
+            <a:ext cx="7162800" cy="369332"/>
+          </a:xfrm>
+          <a:prstGeom prst="rect">
+            <a:avLst/>
+          </a:prstGeom>
+          <a:noFill/>
+        </p:spPr>
+        <p:txBody>
+          <a:bodyPr wrap="square">
+            <a:spAutoFit/>
+          </a:bodyPr>
+          <a:lstStyle/>
+          <a:p>
+            <a:r>
+              <a:rPr lang="sk-SK" dirty="0" err="1"/>
+              <a:t>Výsledek</a:t>
+            </a:r>
+            <a:r>
+              <a:rPr lang="sk-SK" dirty="0"/>
+              <a:t> modelu trénovaného na celé </a:t>
+            </a:r>
+            <a:r>
+              <a:rPr lang="sk-SK" dirty="0" err="1"/>
+              <a:t>datové</a:t>
+            </a:r>
+            <a:r>
+              <a:rPr lang="sk-SK" dirty="0"/>
+              <a:t> </a:t>
+            </a:r>
+            <a:r>
+              <a:rPr lang="sk-SK" dirty="0" err="1"/>
+              <a:t>sadě</a:t>
+            </a:r>
+            <a:r>
+              <a:rPr lang="sk-SK" dirty="0"/>
+              <a:t> </a:t>
+            </a:r>
+            <a:r>
+              <a:rPr lang="en-US" dirty="0"/>
+              <a:t>s</a:t>
+            </a:r>
+            <a:r>
+              <a:rPr lang="sk-SK" dirty="0"/>
+              <a:t> </a:t>
+            </a:r>
+            <a:r>
+              <a:rPr lang="en-US" dirty="0"/>
+              <a:t>dropout</a:t>
+            </a:r>
+            <a:endParaRPr lang="sk-SK" dirty="0"/>
           </a:p>
         </p:txBody>
       </p:sp>
     </p:spTree>
     <p:extLst>
       <p:ext uri="{BB962C8B-B14F-4D97-AF65-F5344CB8AC3E}">
-        <p14:creationId xmlns:p14="http://schemas.microsoft.com/office/powerpoint/2010/main" val="3335491453"/>
+        <p14:creationId xmlns:p14="http://schemas.microsoft.com/office/powerpoint/2010/main" val="715458929"/>
       </p:ext>
     </p:extLst>
   </p:cSld>
@@ -3031,223 +4285,397 @@
           <a:p>
             <a:r>
               <a:rPr lang="cs-CZ" dirty="0"/>
-              <a:t>Výsledky</a:t>
+              <a:t>Ukázky</a:t>
             </a:r>
           </a:p>
         </p:txBody>
       </p:sp>
-    </p:spTree>
-    <p:extLst>
-      <p:ext uri="{BB962C8B-B14F-4D97-AF65-F5344CB8AC3E}">
-        <p14:creationId xmlns:p14="http://schemas.microsoft.com/office/powerpoint/2010/main" val="1585044156"/>
-      </p:ext>
-    </p:extLst>
-  </p:cSld>
-  <p:clrMapOvr>
-    <a:masterClrMapping/>
-  </p:clrMapOvr>
-</p:sld>
-</file>
-
-<file path=ppt/slides/slide5.xml><?xml version="1.0" encoding="utf-8"?>
-<p:sld xmlns:a="http://schemas.openxmlformats.org/drawingml/2006/main" xmlns:r="http://schemas.openxmlformats.org/officeDocument/2006/relationships" xmlns:p="http://schemas.openxmlformats.org/presentationml/2006/main">
-  <p:cSld>
-    <p:spTree>
-      <p:nvGrpSpPr>
-        <p:cNvPr id="1" name=""/>
-        <p:cNvGrpSpPr/>
-        <p:nvPr/>
-      </p:nvGrpSpPr>
-      <p:grpSpPr>
-        <a:xfrm>
-          <a:off x="0" y="0"/>
-          <a:ext cx="0" cy="0"/>
-          <a:chOff x="0" y="0"/>
-          <a:chExt cx="0" cy="0"/>
-        </a:xfrm>
-      </p:grpSpPr>
       <p:sp>
         <p:nvSpPr>
-          <p:cNvPr id="2" name="Nadpis 1">
+          <p:cNvPr id="3" name="AutoShape 2">
             <a:extLst>
               <a:ext uri="{FF2B5EF4-FFF2-40B4-BE49-F238E27FC236}">
-                <a16:creationId xmlns:a16="http://schemas.microsoft.com/office/drawing/2014/main" id="{B6BDDDA3-7169-4A63-A607-9D07D622E605}"/>
+                <a16:creationId xmlns:a16="http://schemas.microsoft.com/office/drawing/2014/main" id="{F2C4ADA9-CD31-4070-B7BF-7412E5D6A671}"/>
               </a:ext>
             </a:extLst>
           </p:cNvPr>
           <p:cNvSpPr>
-            <a:spLocks noGrp="1"/>
+            <a:spLocks noChangeAspect="1" noChangeArrowheads="1"/>
           </p:cNvSpPr>
-          <p:nvPr>
-            <p:ph type="title"/>
-          </p:nvPr>
+          <p:nvPr/>
         </p:nvSpPr>
-        <p:spPr/>
+        <p:spPr bwMode="auto">
+          <a:xfrm>
+            <a:off x="1547664" y="404664"/>
+            <a:ext cx="3176736" cy="3176736"/>
+          </a:xfrm>
+          <a:prstGeom prst="rect">
+            <a:avLst/>
+          </a:prstGeom>
+          <a:noFill/>
+          <a:extLst>
+            <a:ext uri="{909E8E84-426E-40DD-AFC4-6F175D3DCCD1}">
+              <a14:hiddenFill xmlns:a14="http://schemas.microsoft.com/office/drawing/2010/main">
+                <a:solidFill>
+                  <a:srgbClr val="FFFFFF"/>
+                </a:solidFill>
+              </a14:hiddenFill>
+            </a:ext>
+          </a:extLst>
+        </p:spPr>
         <p:txBody>
-          <a:bodyPr/>
+          <a:bodyPr vert="horz" wrap="square" lIns="91440" tIns="45720" rIns="91440" bIns="45720" numCol="1" anchor="t" anchorCtr="0" compatLnSpc="1">
+            <a:prstTxWarp prst="textNoShape">
+              <a:avLst/>
+            </a:prstTxWarp>
+          </a:bodyPr>
           <a:lstStyle/>
           <a:p>
-            <a:r>
-              <a:rPr lang="cs-CZ" dirty="0"/>
-              <a:t>Výsledky</a:t>
-            </a:r>
+            <a:endParaRPr lang="sk-SK"/>
           </a:p>
         </p:txBody>
       </p:sp>
-    </p:spTree>
-    <p:extLst>
-      <p:ext uri="{BB962C8B-B14F-4D97-AF65-F5344CB8AC3E}">
-        <p14:creationId xmlns:p14="http://schemas.microsoft.com/office/powerpoint/2010/main" val="3159322703"/>
-      </p:ext>
-    </p:extLst>
-  </p:cSld>
-  <p:clrMapOvr>
-    <a:masterClrMapping/>
-  </p:clrMapOvr>
-</p:sld>
-</file>
-
-<file path=ppt/slides/slide6.xml><?xml version="1.0" encoding="utf-8"?>
-<p:sld xmlns:a="http://schemas.openxmlformats.org/drawingml/2006/main" xmlns:r="http://schemas.openxmlformats.org/officeDocument/2006/relationships" xmlns:p="http://schemas.openxmlformats.org/presentationml/2006/main">
-  <p:cSld>
-    <p:spTree>
-      <p:nvGrpSpPr>
-        <p:cNvPr id="1" name=""/>
-        <p:cNvGrpSpPr/>
-        <p:nvPr/>
-      </p:nvGrpSpPr>
-      <p:grpSpPr>
-        <a:xfrm>
-          <a:off x="0" y="0"/>
-          <a:ext cx="0" cy="0"/>
-          <a:chOff x="0" y="0"/>
-          <a:chExt cx="0" cy="0"/>
-        </a:xfrm>
-      </p:grpSpPr>
       <p:sp>
         <p:nvSpPr>
-          <p:cNvPr id="2" name="Nadpis 1">
+          <p:cNvPr id="6" name="BlokTextu 5">
             <a:extLst>
               <a:ext uri="{FF2B5EF4-FFF2-40B4-BE49-F238E27FC236}">
-                <a16:creationId xmlns:a16="http://schemas.microsoft.com/office/drawing/2014/main" id="{B6BDDDA3-7169-4A63-A607-9D07D622E605}"/>
+                <a16:creationId xmlns:a16="http://schemas.microsoft.com/office/drawing/2014/main" id="{A72EB6DE-2576-48A3-8990-763A839FEA17}"/>
               </a:ext>
             </a:extLst>
           </p:cNvPr>
-          <p:cNvSpPr>
-            <a:spLocks noGrp="1"/>
-          </p:cNvSpPr>
-          <p:nvPr>
-            <p:ph type="title"/>
-          </p:nvPr>
+          <p:cNvSpPr txBox="1"/>
+          <p:nvPr/>
         </p:nvSpPr>
-        <p:spPr/>
+        <p:spPr>
+          <a:xfrm>
+            <a:off x="457200" y="1417639"/>
+            <a:ext cx="8229600" cy="3970318"/>
+          </a:xfrm>
+          <a:prstGeom prst="rect">
+            <a:avLst/>
+          </a:prstGeom>
+          <a:noFill/>
+        </p:spPr>
         <p:txBody>
-          <a:bodyPr/>
+          <a:bodyPr wrap="square">
+            <a:spAutoFit/>
+          </a:bodyPr>
           <a:lstStyle/>
           <a:p>
-            <a:r>
-              <a:rPr lang="cs-CZ" dirty="0"/>
-              <a:t>Ukázky</a:t>
-            </a:r>
+            <a:pPr marL="457200" indent="-457200" algn="l">
+              <a:buFont typeface="Arial" panose="020B0604020202020204" pitchFamily="34" charset="0"/>
+              <a:buChar char="•"/>
+            </a:pPr>
+            <a:r>
+              <a:rPr lang="en-US" dirty="0"/>
+              <a:t>Easy test</a:t>
+            </a:r>
+            <a:endParaRPr lang="sk-SK" dirty="0"/>
+          </a:p>
+          <a:p>
+            <a:pPr marL="457200" indent="-457200" algn="l">
+              <a:buFont typeface="Arial" panose="020B0604020202020204" pitchFamily="34" charset="0"/>
+              <a:buChar char="•"/>
+            </a:pPr>
+            <a:endParaRPr lang="en-US" dirty="0"/>
+          </a:p>
+          <a:p>
+            <a:pPr marL="457200" indent="-457200" algn="l">
+              <a:buFont typeface="Arial" panose="020B0604020202020204" pitchFamily="34" charset="0"/>
+              <a:buChar char="•"/>
+            </a:pPr>
+            <a:endParaRPr lang="en-US" dirty="0"/>
+          </a:p>
+          <a:p>
+            <a:pPr algn="l"/>
+            <a:endParaRPr lang="en-US" dirty="0"/>
+          </a:p>
+          <a:p>
+            <a:pPr marL="457200" indent="-457200" algn="l">
+              <a:buFont typeface="Arial" panose="020B0604020202020204" pitchFamily="34" charset="0"/>
+              <a:buChar char="•"/>
+            </a:pPr>
+            <a:r>
+              <a:rPr lang="en-US" dirty="0"/>
+              <a:t>Medium test</a:t>
+            </a:r>
+          </a:p>
+          <a:p>
+            <a:pPr marL="457200" indent="-457200" algn="l">
+              <a:buFont typeface="Arial" panose="020B0604020202020204" pitchFamily="34" charset="0"/>
+              <a:buChar char="•"/>
+            </a:pPr>
+            <a:endParaRPr lang="en-US" dirty="0"/>
+          </a:p>
+          <a:p>
+            <a:pPr marL="457200" indent="-457200" algn="l">
+              <a:buFont typeface="Arial" panose="020B0604020202020204" pitchFamily="34" charset="0"/>
+              <a:buChar char="•"/>
+            </a:pPr>
+            <a:endParaRPr lang="sk-SK" dirty="0"/>
+          </a:p>
+          <a:p>
+            <a:pPr marL="457200" indent="-457200" algn="l">
+              <a:buFont typeface="Arial" panose="020B0604020202020204" pitchFamily="34" charset="0"/>
+              <a:buChar char="•"/>
+            </a:pPr>
+            <a:endParaRPr lang="sk-SK" dirty="0"/>
+          </a:p>
+          <a:p>
+            <a:pPr marL="457200" indent="-457200" algn="l">
+              <a:buFont typeface="Arial" panose="020B0604020202020204" pitchFamily="34" charset="0"/>
+              <a:buChar char="•"/>
+            </a:pPr>
+            <a:endParaRPr lang="en-US" dirty="0"/>
+          </a:p>
+          <a:p>
+            <a:pPr algn="l"/>
+            <a:endParaRPr lang="en-US" dirty="0"/>
+          </a:p>
+          <a:p>
+            <a:pPr marL="457200" indent="-457200" algn="l">
+              <a:buFont typeface="Arial" panose="020B0604020202020204" pitchFamily="34" charset="0"/>
+              <a:buChar char="•"/>
+            </a:pPr>
+            <a:r>
+              <a:rPr lang="en-US" dirty="0"/>
+              <a:t>Hard test</a:t>
+            </a:r>
+          </a:p>
+          <a:p>
+            <a:endParaRPr lang="en-US" dirty="0"/>
+          </a:p>
+          <a:p>
+            <a:pPr marL="457200" indent="-457200">
+              <a:buFont typeface="Arial" panose="020B0604020202020204" pitchFamily="34" charset="0"/>
+              <a:buChar char="•"/>
+            </a:pPr>
+            <a:endParaRPr lang="cs-CZ" dirty="0"/>
+          </a:p>
+          <a:p>
+            <a:pPr marL="457200" indent="-457200" algn="l">
+              <a:buFont typeface="Arial" panose="020B0604020202020204" pitchFamily="34" charset="0"/>
+              <a:buChar char="•"/>
+            </a:pPr>
+            <a:endParaRPr lang="en-US" dirty="0"/>
           </a:p>
         </p:txBody>
       </p:sp>
+      <p:pic>
+        <p:nvPicPr>
+          <p:cNvPr id="9" name="Obrázok 8">
+            <a:extLst>
+              <a:ext uri="{FF2B5EF4-FFF2-40B4-BE49-F238E27FC236}">
+                <a16:creationId xmlns:a16="http://schemas.microsoft.com/office/drawing/2014/main" id="{9E2D3944-B536-42AB-987A-E7FEC8D301E8}"/>
+              </a:ext>
+            </a:extLst>
+          </p:cNvPr>
+          <p:cNvPicPr>
+            <a:picLocks noChangeAspect="1"/>
+          </p:cNvPicPr>
+          <p:nvPr/>
+        </p:nvPicPr>
+        <p:blipFill>
+          <a:blip r:embed="rId3"/>
+          <a:stretch>
+            <a:fillRect/>
+          </a:stretch>
+        </p:blipFill>
+        <p:spPr>
+          <a:xfrm>
+            <a:off x="462952" y="1772816"/>
+            <a:ext cx="3114675" cy="685800"/>
+          </a:xfrm>
+          <a:prstGeom prst="rect">
+            <a:avLst/>
+          </a:prstGeom>
+        </p:spPr>
+      </p:pic>
+      <p:pic>
+        <p:nvPicPr>
+          <p:cNvPr id="11" name="Obrázok 10">
+            <a:extLst>
+              <a:ext uri="{FF2B5EF4-FFF2-40B4-BE49-F238E27FC236}">
+                <a16:creationId xmlns:a16="http://schemas.microsoft.com/office/drawing/2014/main" id="{9C0339A0-9048-410B-B326-7C5CE9052048}"/>
+              </a:ext>
+            </a:extLst>
+          </p:cNvPr>
+          <p:cNvPicPr>
+            <a:picLocks noChangeAspect="1"/>
+          </p:cNvPicPr>
+          <p:nvPr/>
+        </p:nvPicPr>
+        <p:blipFill>
+          <a:blip r:embed="rId4"/>
+          <a:stretch>
+            <a:fillRect/>
+          </a:stretch>
+        </p:blipFill>
+        <p:spPr>
+          <a:xfrm>
+            <a:off x="3612263" y="1772816"/>
+            <a:ext cx="2457450" cy="685800"/>
+          </a:xfrm>
+          <a:prstGeom prst="rect">
+            <a:avLst/>
+          </a:prstGeom>
+        </p:spPr>
+      </p:pic>
+      <p:pic>
+        <p:nvPicPr>
+          <p:cNvPr id="12" name="Obrázok 11">
+            <a:extLst>
+              <a:ext uri="{FF2B5EF4-FFF2-40B4-BE49-F238E27FC236}">
+                <a16:creationId xmlns:a16="http://schemas.microsoft.com/office/drawing/2014/main" id="{578F71CE-26AB-41AA-8010-3697FA138963}"/>
+              </a:ext>
+            </a:extLst>
+          </p:cNvPr>
+          <p:cNvPicPr>
+            <a:picLocks noChangeAspect="1"/>
+          </p:cNvPicPr>
+          <p:nvPr/>
+        </p:nvPicPr>
+        <p:blipFill>
+          <a:blip r:embed="rId5"/>
+          <a:stretch>
+            <a:fillRect/>
+          </a:stretch>
+        </p:blipFill>
+        <p:spPr>
+          <a:xfrm>
+            <a:off x="6091809" y="1778152"/>
+            <a:ext cx="2619375" cy="685800"/>
+          </a:xfrm>
+          <a:prstGeom prst="rect">
+            <a:avLst/>
+          </a:prstGeom>
+        </p:spPr>
+      </p:pic>
+      <p:pic>
+        <p:nvPicPr>
+          <p:cNvPr id="14" name="Obrázok 13">
+            <a:extLst>
+              <a:ext uri="{FF2B5EF4-FFF2-40B4-BE49-F238E27FC236}">
+                <a16:creationId xmlns:a16="http://schemas.microsoft.com/office/drawing/2014/main" id="{8E0AE57E-2126-4120-AEC1-23CED48C1830}"/>
+              </a:ext>
+            </a:extLst>
+          </p:cNvPr>
+          <p:cNvPicPr>
+            <a:picLocks noChangeAspect="1"/>
+          </p:cNvPicPr>
+          <p:nvPr/>
+        </p:nvPicPr>
+        <p:blipFill>
+          <a:blip r:embed="rId6"/>
+          <a:stretch>
+            <a:fillRect/>
+          </a:stretch>
+        </p:blipFill>
+        <p:spPr>
+          <a:xfrm>
+            <a:off x="457200" y="2855497"/>
+            <a:ext cx="5467350" cy="685800"/>
+          </a:xfrm>
+          <a:prstGeom prst="rect">
+            <a:avLst/>
+          </a:prstGeom>
+        </p:spPr>
+      </p:pic>
+      <p:pic>
+        <p:nvPicPr>
+          <p:cNvPr id="16" name="Obrázok 15">
+            <a:extLst>
+              <a:ext uri="{FF2B5EF4-FFF2-40B4-BE49-F238E27FC236}">
+                <a16:creationId xmlns:a16="http://schemas.microsoft.com/office/drawing/2014/main" id="{57E835BE-98DF-4EC2-B82A-45444F41C84B}"/>
+              </a:ext>
+            </a:extLst>
+          </p:cNvPr>
+          <p:cNvPicPr>
+            <a:picLocks noChangeAspect="1"/>
+          </p:cNvPicPr>
+          <p:nvPr/>
+        </p:nvPicPr>
+        <p:blipFill>
+          <a:blip r:embed="rId7"/>
+          <a:stretch>
+            <a:fillRect/>
+          </a:stretch>
+        </p:blipFill>
+        <p:spPr>
+          <a:xfrm>
+            <a:off x="457200" y="3553574"/>
+            <a:ext cx="6400800" cy="685800"/>
+          </a:xfrm>
+          <a:prstGeom prst="rect">
+            <a:avLst/>
+          </a:prstGeom>
+        </p:spPr>
+      </p:pic>
+      <p:pic>
+        <p:nvPicPr>
+          <p:cNvPr id="18" name="Obrázok 17">
+            <a:extLst>
+              <a:ext uri="{FF2B5EF4-FFF2-40B4-BE49-F238E27FC236}">
+                <a16:creationId xmlns:a16="http://schemas.microsoft.com/office/drawing/2014/main" id="{1A54154C-2E1A-430C-AF8A-B9F5218C5FFC}"/>
+              </a:ext>
+            </a:extLst>
+          </p:cNvPr>
+          <p:cNvPicPr>
+            <a:picLocks noChangeAspect="1"/>
+          </p:cNvPicPr>
+          <p:nvPr/>
+        </p:nvPicPr>
+        <p:blipFill>
+          <a:blip r:embed="rId8"/>
+          <a:stretch>
+            <a:fillRect/>
+          </a:stretch>
+        </p:blipFill>
+        <p:spPr>
+          <a:xfrm>
+            <a:off x="457200" y="4600168"/>
+            <a:ext cx="5886450" cy="685800"/>
+          </a:xfrm>
+          <a:prstGeom prst="rect">
+            <a:avLst/>
+          </a:prstGeom>
+        </p:spPr>
+      </p:pic>
+      <p:pic>
+        <p:nvPicPr>
+          <p:cNvPr id="19" name="Obrázok 18">
+            <a:extLst>
+              <a:ext uri="{FF2B5EF4-FFF2-40B4-BE49-F238E27FC236}">
+                <a16:creationId xmlns:a16="http://schemas.microsoft.com/office/drawing/2014/main" id="{72083007-CF9F-44FC-AD3C-A1F2AF7BE554}"/>
+              </a:ext>
+            </a:extLst>
+          </p:cNvPr>
+          <p:cNvPicPr>
+            <a:picLocks noChangeAspect="1"/>
+          </p:cNvPicPr>
+          <p:nvPr/>
+        </p:nvPicPr>
+        <p:blipFill>
+          <a:blip r:embed="rId9"/>
+          <a:stretch>
+            <a:fillRect/>
+          </a:stretch>
+        </p:blipFill>
+        <p:spPr>
+          <a:xfrm>
+            <a:off x="6472237" y="4600168"/>
+            <a:ext cx="2257425" cy="685800"/>
+          </a:xfrm>
+          <a:prstGeom prst="rect">
+            <a:avLst/>
+          </a:prstGeom>
+        </p:spPr>
+      </p:pic>
     </p:spTree>
     <p:extLst>
       <p:ext uri="{BB962C8B-B14F-4D97-AF65-F5344CB8AC3E}">
         <p14:creationId xmlns:p14="http://schemas.microsoft.com/office/powerpoint/2010/main" val="3700801758"/>
-      </p:ext>
-    </p:extLst>
-  </p:cSld>
-  <p:clrMapOvr>
-    <a:masterClrMapping/>
-  </p:clrMapOvr>
-</p:sld>
-</file>
-
-<file path=ppt/slides/slide7.xml><?xml version="1.0" encoding="utf-8"?>
-<p:sld xmlns:a="http://schemas.openxmlformats.org/drawingml/2006/main" xmlns:r="http://schemas.openxmlformats.org/officeDocument/2006/relationships" xmlns:p="http://schemas.openxmlformats.org/presentationml/2006/main">
-  <p:cSld>
-    <p:spTree>
-      <p:nvGrpSpPr>
-        <p:cNvPr id="1" name=""/>
-        <p:cNvGrpSpPr/>
-        <p:nvPr/>
-      </p:nvGrpSpPr>
-      <p:grpSpPr>
-        <a:xfrm>
-          <a:off x="0" y="0"/>
-          <a:ext cx="0" cy="0"/>
-          <a:chOff x="0" y="0"/>
-          <a:chExt cx="0" cy="0"/>
-        </a:xfrm>
-      </p:grpSpPr>
-      <p:sp>
-        <p:nvSpPr>
-          <p:cNvPr id="2" name="Nadpis 1">
-            <a:extLst>
-              <a:ext uri="{FF2B5EF4-FFF2-40B4-BE49-F238E27FC236}">
-                <a16:creationId xmlns:a16="http://schemas.microsoft.com/office/drawing/2014/main" id="{8F716BD9-5AD6-4414-A10A-830C18C10D76}"/>
-              </a:ext>
-            </a:extLst>
-          </p:cNvPr>
-          <p:cNvSpPr>
-            <a:spLocks noGrp="1"/>
-          </p:cNvSpPr>
-          <p:nvPr>
-            <p:ph type="title"/>
-          </p:nvPr>
-        </p:nvSpPr>
-        <p:spPr/>
-        <p:txBody>
-          <a:bodyPr/>
-          <a:lstStyle/>
-          <a:p>
-            <a:r>
-              <a:rPr lang="cs-CZ" dirty="0"/>
-              <a:t>Shrnutí</a:t>
-            </a:r>
-          </a:p>
-        </p:txBody>
-      </p:sp>
-      <p:sp>
-        <p:nvSpPr>
-          <p:cNvPr id="3" name="Zástupný obsah 2">
-            <a:extLst>
-              <a:ext uri="{FF2B5EF4-FFF2-40B4-BE49-F238E27FC236}">
-                <a16:creationId xmlns:a16="http://schemas.microsoft.com/office/drawing/2014/main" id="{E5067C42-EAD7-4A49-81FB-0A9242401B4F}"/>
-              </a:ext>
-            </a:extLst>
-          </p:cNvPr>
-          <p:cNvSpPr>
-            <a:spLocks noGrp="1"/>
-          </p:cNvSpPr>
-          <p:nvPr>
-            <p:ph idx="1"/>
-          </p:nvPr>
-        </p:nvSpPr>
-        <p:spPr/>
-        <p:txBody>
-          <a:bodyPr/>
-          <a:lstStyle/>
-          <a:p>
-            <a:pPr marL="457200" indent="-457200" algn="l">
-              <a:buFont typeface="Arial" panose="020B0604020202020204" pitchFamily="34" charset="0"/>
-              <a:buChar char="•"/>
-            </a:pPr>
-            <a:r>
-              <a:rPr lang="cs-CZ" dirty="0">
-                <a:latin typeface="+mj-lt"/>
-              </a:rPr>
-              <a:t>neco</a:t>
-            </a:r>
-          </a:p>
-        </p:txBody>
-      </p:sp>
-    </p:spTree>
-    <p:extLst>
-      <p:ext uri="{BB962C8B-B14F-4D97-AF65-F5344CB8AC3E}">
-        <p14:creationId xmlns:p14="http://schemas.microsoft.com/office/powerpoint/2010/main" val="498582774"/>
       </p:ext>
     </p:extLst>
   </p:cSld>

</xml_diff>